<commit_message>
updated the hand in files
</commit_message>
<xml_diff>
--- a/Final-Year-Project/Presentations/Assessed Progress presentation.pptx
+++ b/Final-Year-Project/Presentations/Assessed Progress presentation.pptx
@@ -8,6 +8,7 @@
     <p:sldId id="256" r:id="rId2"/>
     <p:sldId id="257" r:id="rId3"/>
     <p:sldId id="258" r:id="rId4"/>
+    <p:sldId id="259" r:id="rId5"/>
   </p:sldIdLst>
   <p:sldSz cx="12192000" cy="6858000"/>
   <p:notesSz cx="6858000" cy="9144000"/>
@@ -106,6 +107,11 @@
       </a:defRPr>
     </a:lvl9pPr>
   </p:defaultTextStyle>
+  <p:extLst>
+    <p:ext uri="{EFAFB233-063F-42B5-8137-9DF3F51BA10A}">
+      <p15:sldGuideLst xmlns:p15="http://schemas.microsoft.com/office/powerpoint/2012/main"/>
+    </p:ext>
+  </p:extLst>
 </p:presentation>
 </file>
 
@@ -5889,6 +5895,1368 @@
   <p:clrMapOvr>
     <a:masterClrMapping/>
   </p:clrMapOvr>
+  <p:timing>
+    <p:tnLst>
+      <p:par>
+        <p:cTn id="1" dur="indefinite" restart="never" nodeType="tmRoot">
+          <p:childTnLst>
+            <p:seq concurrent="1" nextAc="seek">
+              <p:cTn id="2" dur="indefinite" nodeType="mainSeq">
+                <p:childTnLst>
+                  <p:par>
+                    <p:cTn id="3" fill="hold">
+                      <p:stCondLst>
+                        <p:cond delay="indefinite"/>
+                      </p:stCondLst>
+                      <p:childTnLst>
+                        <p:par>
+                          <p:cTn id="4" fill="hold">
+                            <p:stCondLst>
+                              <p:cond delay="0"/>
+                            </p:stCondLst>
+                            <p:childTnLst>
+                              <p:par>
+                                <p:cTn id="5" presetID="42" presetClass="entr" presetSubtype="0" fill="hold" grpId="0" nodeType="clickEffect">
+                                  <p:stCondLst>
+                                    <p:cond delay="0"/>
+                                  </p:stCondLst>
+                                  <p:childTnLst>
+                                    <p:set>
+                                      <p:cBhvr>
+                                        <p:cTn id="6" dur="1" fill="hold">
+                                          <p:stCondLst>
+                                            <p:cond delay="0"/>
+                                          </p:stCondLst>
+                                        </p:cTn>
+                                        <p:tgtEl>
+                                          <p:spTgt spid="2"/>
+                                        </p:tgtEl>
+                                        <p:attrNameLst>
+                                          <p:attrName>style.visibility</p:attrName>
+                                        </p:attrNameLst>
+                                      </p:cBhvr>
+                                      <p:to>
+                                        <p:strVal val="visible"/>
+                                      </p:to>
+                                    </p:set>
+                                    <p:animEffect transition="in" filter="fade">
+                                      <p:cBhvr>
+                                        <p:cTn id="7" dur="1000"/>
+                                        <p:tgtEl>
+                                          <p:spTgt spid="2"/>
+                                        </p:tgtEl>
+                                      </p:cBhvr>
+                                    </p:animEffect>
+                                    <p:anim calcmode="lin" valueType="num">
+                                      <p:cBhvr>
+                                        <p:cTn id="8" dur="1000" fill="hold"/>
+                                        <p:tgtEl>
+                                          <p:spTgt spid="2"/>
+                                        </p:tgtEl>
+                                        <p:attrNameLst>
+                                          <p:attrName>ppt_x</p:attrName>
+                                        </p:attrNameLst>
+                                      </p:cBhvr>
+                                      <p:tavLst>
+                                        <p:tav tm="0">
+                                          <p:val>
+                                            <p:strVal val="#ppt_x"/>
+                                          </p:val>
+                                        </p:tav>
+                                        <p:tav tm="100000">
+                                          <p:val>
+                                            <p:strVal val="#ppt_x"/>
+                                          </p:val>
+                                        </p:tav>
+                                      </p:tavLst>
+                                    </p:anim>
+                                    <p:anim calcmode="lin" valueType="num">
+                                      <p:cBhvr>
+                                        <p:cTn id="9" dur="1000" fill="hold"/>
+                                        <p:tgtEl>
+                                          <p:spTgt spid="2"/>
+                                        </p:tgtEl>
+                                        <p:attrNameLst>
+                                          <p:attrName>ppt_y</p:attrName>
+                                        </p:attrNameLst>
+                                      </p:cBhvr>
+                                      <p:tavLst>
+                                        <p:tav tm="0">
+                                          <p:val>
+                                            <p:strVal val="#ppt_y+.1"/>
+                                          </p:val>
+                                        </p:tav>
+                                        <p:tav tm="100000">
+                                          <p:val>
+                                            <p:strVal val="#ppt_y"/>
+                                          </p:val>
+                                        </p:tav>
+                                      </p:tavLst>
+                                    </p:anim>
+                                  </p:childTnLst>
+                                </p:cTn>
+                              </p:par>
+                            </p:childTnLst>
+                          </p:cTn>
+                        </p:par>
+                      </p:childTnLst>
+                    </p:cTn>
+                  </p:par>
+                  <p:par>
+                    <p:cTn id="10" fill="hold">
+                      <p:stCondLst>
+                        <p:cond delay="indefinite"/>
+                      </p:stCondLst>
+                      <p:childTnLst>
+                        <p:par>
+                          <p:cTn id="11" fill="hold">
+                            <p:stCondLst>
+                              <p:cond delay="0"/>
+                            </p:stCondLst>
+                            <p:childTnLst>
+                              <p:par>
+                                <p:cTn id="12" presetID="42" presetClass="entr" presetSubtype="0" fill="hold" grpId="0" nodeType="clickEffect">
+                                  <p:stCondLst>
+                                    <p:cond delay="0"/>
+                                  </p:stCondLst>
+                                  <p:childTnLst>
+                                    <p:set>
+                                      <p:cBhvr>
+                                        <p:cTn id="13" dur="1" fill="hold">
+                                          <p:stCondLst>
+                                            <p:cond delay="0"/>
+                                          </p:stCondLst>
+                                        </p:cTn>
+                                        <p:tgtEl>
+                                          <p:spTgt spid="3">
+                                            <p:txEl>
+                                              <p:pRg st="0" end="0"/>
+                                            </p:txEl>
+                                          </p:spTgt>
+                                        </p:tgtEl>
+                                        <p:attrNameLst>
+                                          <p:attrName>style.visibility</p:attrName>
+                                        </p:attrNameLst>
+                                      </p:cBhvr>
+                                      <p:to>
+                                        <p:strVal val="visible"/>
+                                      </p:to>
+                                    </p:set>
+                                    <p:animEffect transition="in" filter="fade">
+                                      <p:cBhvr>
+                                        <p:cTn id="14" dur="1000"/>
+                                        <p:tgtEl>
+                                          <p:spTgt spid="3">
+                                            <p:txEl>
+                                              <p:pRg st="0" end="0"/>
+                                            </p:txEl>
+                                          </p:spTgt>
+                                        </p:tgtEl>
+                                      </p:cBhvr>
+                                    </p:animEffect>
+                                    <p:anim calcmode="lin" valueType="num">
+                                      <p:cBhvr>
+                                        <p:cTn id="15" dur="1000" fill="hold"/>
+                                        <p:tgtEl>
+                                          <p:spTgt spid="3">
+                                            <p:txEl>
+                                              <p:pRg st="0" end="0"/>
+                                            </p:txEl>
+                                          </p:spTgt>
+                                        </p:tgtEl>
+                                        <p:attrNameLst>
+                                          <p:attrName>ppt_x</p:attrName>
+                                        </p:attrNameLst>
+                                      </p:cBhvr>
+                                      <p:tavLst>
+                                        <p:tav tm="0">
+                                          <p:val>
+                                            <p:strVal val="#ppt_x"/>
+                                          </p:val>
+                                        </p:tav>
+                                        <p:tav tm="100000">
+                                          <p:val>
+                                            <p:strVal val="#ppt_x"/>
+                                          </p:val>
+                                        </p:tav>
+                                      </p:tavLst>
+                                    </p:anim>
+                                    <p:anim calcmode="lin" valueType="num">
+                                      <p:cBhvr>
+                                        <p:cTn id="16" dur="1000" fill="hold"/>
+                                        <p:tgtEl>
+                                          <p:spTgt spid="3">
+                                            <p:txEl>
+                                              <p:pRg st="0" end="0"/>
+                                            </p:txEl>
+                                          </p:spTgt>
+                                        </p:tgtEl>
+                                        <p:attrNameLst>
+                                          <p:attrName>ppt_y</p:attrName>
+                                        </p:attrNameLst>
+                                      </p:cBhvr>
+                                      <p:tavLst>
+                                        <p:tav tm="0">
+                                          <p:val>
+                                            <p:strVal val="#ppt_y+.1"/>
+                                          </p:val>
+                                        </p:tav>
+                                        <p:tav tm="100000">
+                                          <p:val>
+                                            <p:strVal val="#ppt_y"/>
+                                          </p:val>
+                                        </p:tav>
+                                      </p:tavLst>
+                                    </p:anim>
+                                  </p:childTnLst>
+                                </p:cTn>
+                              </p:par>
+                              <p:par>
+                                <p:cTn id="17" presetID="42" presetClass="entr" presetSubtype="0" fill="hold" grpId="0" nodeType="withEffect">
+                                  <p:stCondLst>
+                                    <p:cond delay="0"/>
+                                  </p:stCondLst>
+                                  <p:childTnLst>
+                                    <p:set>
+                                      <p:cBhvr>
+                                        <p:cTn id="18" dur="1" fill="hold">
+                                          <p:stCondLst>
+                                            <p:cond delay="0"/>
+                                          </p:stCondLst>
+                                        </p:cTn>
+                                        <p:tgtEl>
+                                          <p:spTgt spid="3">
+                                            <p:txEl>
+                                              <p:pRg st="1" end="1"/>
+                                            </p:txEl>
+                                          </p:spTgt>
+                                        </p:tgtEl>
+                                        <p:attrNameLst>
+                                          <p:attrName>style.visibility</p:attrName>
+                                        </p:attrNameLst>
+                                      </p:cBhvr>
+                                      <p:to>
+                                        <p:strVal val="visible"/>
+                                      </p:to>
+                                    </p:set>
+                                    <p:animEffect transition="in" filter="fade">
+                                      <p:cBhvr>
+                                        <p:cTn id="19" dur="1000"/>
+                                        <p:tgtEl>
+                                          <p:spTgt spid="3">
+                                            <p:txEl>
+                                              <p:pRg st="1" end="1"/>
+                                            </p:txEl>
+                                          </p:spTgt>
+                                        </p:tgtEl>
+                                      </p:cBhvr>
+                                    </p:animEffect>
+                                    <p:anim calcmode="lin" valueType="num">
+                                      <p:cBhvr>
+                                        <p:cTn id="20" dur="1000" fill="hold"/>
+                                        <p:tgtEl>
+                                          <p:spTgt spid="3">
+                                            <p:txEl>
+                                              <p:pRg st="1" end="1"/>
+                                            </p:txEl>
+                                          </p:spTgt>
+                                        </p:tgtEl>
+                                        <p:attrNameLst>
+                                          <p:attrName>ppt_x</p:attrName>
+                                        </p:attrNameLst>
+                                      </p:cBhvr>
+                                      <p:tavLst>
+                                        <p:tav tm="0">
+                                          <p:val>
+                                            <p:strVal val="#ppt_x"/>
+                                          </p:val>
+                                        </p:tav>
+                                        <p:tav tm="100000">
+                                          <p:val>
+                                            <p:strVal val="#ppt_x"/>
+                                          </p:val>
+                                        </p:tav>
+                                      </p:tavLst>
+                                    </p:anim>
+                                    <p:anim calcmode="lin" valueType="num">
+                                      <p:cBhvr>
+                                        <p:cTn id="21" dur="1000" fill="hold"/>
+                                        <p:tgtEl>
+                                          <p:spTgt spid="3">
+                                            <p:txEl>
+                                              <p:pRg st="1" end="1"/>
+                                            </p:txEl>
+                                          </p:spTgt>
+                                        </p:tgtEl>
+                                        <p:attrNameLst>
+                                          <p:attrName>ppt_y</p:attrName>
+                                        </p:attrNameLst>
+                                      </p:cBhvr>
+                                      <p:tavLst>
+                                        <p:tav tm="0">
+                                          <p:val>
+                                            <p:strVal val="#ppt_y+.1"/>
+                                          </p:val>
+                                        </p:tav>
+                                        <p:tav tm="100000">
+                                          <p:val>
+                                            <p:strVal val="#ppt_y"/>
+                                          </p:val>
+                                        </p:tav>
+                                      </p:tavLst>
+                                    </p:anim>
+                                  </p:childTnLst>
+                                </p:cTn>
+                              </p:par>
+                            </p:childTnLst>
+                          </p:cTn>
+                        </p:par>
+                      </p:childTnLst>
+                    </p:cTn>
+                  </p:par>
+                  <p:par>
+                    <p:cTn id="22" fill="hold">
+                      <p:stCondLst>
+                        <p:cond delay="indefinite"/>
+                      </p:stCondLst>
+                      <p:childTnLst>
+                        <p:par>
+                          <p:cTn id="23" fill="hold">
+                            <p:stCondLst>
+                              <p:cond delay="0"/>
+                            </p:stCondLst>
+                            <p:childTnLst>
+                              <p:par>
+                                <p:cTn id="24" presetID="42" presetClass="entr" presetSubtype="0" fill="hold" grpId="0" nodeType="clickEffect">
+                                  <p:stCondLst>
+                                    <p:cond delay="0"/>
+                                  </p:stCondLst>
+                                  <p:childTnLst>
+                                    <p:set>
+                                      <p:cBhvr>
+                                        <p:cTn id="25" dur="1" fill="hold">
+                                          <p:stCondLst>
+                                            <p:cond delay="0"/>
+                                          </p:stCondLst>
+                                        </p:cTn>
+                                        <p:tgtEl>
+                                          <p:spTgt spid="3">
+                                            <p:txEl>
+                                              <p:pRg st="2" end="2"/>
+                                            </p:txEl>
+                                          </p:spTgt>
+                                        </p:tgtEl>
+                                        <p:attrNameLst>
+                                          <p:attrName>style.visibility</p:attrName>
+                                        </p:attrNameLst>
+                                      </p:cBhvr>
+                                      <p:to>
+                                        <p:strVal val="visible"/>
+                                      </p:to>
+                                    </p:set>
+                                    <p:animEffect transition="in" filter="fade">
+                                      <p:cBhvr>
+                                        <p:cTn id="26" dur="1000"/>
+                                        <p:tgtEl>
+                                          <p:spTgt spid="3">
+                                            <p:txEl>
+                                              <p:pRg st="2" end="2"/>
+                                            </p:txEl>
+                                          </p:spTgt>
+                                        </p:tgtEl>
+                                      </p:cBhvr>
+                                    </p:animEffect>
+                                    <p:anim calcmode="lin" valueType="num">
+                                      <p:cBhvr>
+                                        <p:cTn id="27" dur="1000" fill="hold"/>
+                                        <p:tgtEl>
+                                          <p:spTgt spid="3">
+                                            <p:txEl>
+                                              <p:pRg st="2" end="2"/>
+                                            </p:txEl>
+                                          </p:spTgt>
+                                        </p:tgtEl>
+                                        <p:attrNameLst>
+                                          <p:attrName>ppt_x</p:attrName>
+                                        </p:attrNameLst>
+                                      </p:cBhvr>
+                                      <p:tavLst>
+                                        <p:tav tm="0">
+                                          <p:val>
+                                            <p:strVal val="#ppt_x"/>
+                                          </p:val>
+                                        </p:tav>
+                                        <p:tav tm="100000">
+                                          <p:val>
+                                            <p:strVal val="#ppt_x"/>
+                                          </p:val>
+                                        </p:tav>
+                                      </p:tavLst>
+                                    </p:anim>
+                                    <p:anim calcmode="lin" valueType="num">
+                                      <p:cBhvr>
+                                        <p:cTn id="28" dur="1000" fill="hold"/>
+                                        <p:tgtEl>
+                                          <p:spTgt spid="3">
+                                            <p:txEl>
+                                              <p:pRg st="2" end="2"/>
+                                            </p:txEl>
+                                          </p:spTgt>
+                                        </p:tgtEl>
+                                        <p:attrNameLst>
+                                          <p:attrName>ppt_y</p:attrName>
+                                        </p:attrNameLst>
+                                      </p:cBhvr>
+                                      <p:tavLst>
+                                        <p:tav tm="0">
+                                          <p:val>
+                                            <p:strVal val="#ppt_y+.1"/>
+                                          </p:val>
+                                        </p:tav>
+                                        <p:tav tm="100000">
+                                          <p:val>
+                                            <p:strVal val="#ppt_y"/>
+                                          </p:val>
+                                        </p:tav>
+                                      </p:tavLst>
+                                    </p:anim>
+                                  </p:childTnLst>
+                                </p:cTn>
+                              </p:par>
+                              <p:par>
+                                <p:cTn id="29" presetID="42" presetClass="entr" presetSubtype="0" fill="hold" grpId="0" nodeType="withEffect">
+                                  <p:stCondLst>
+                                    <p:cond delay="0"/>
+                                  </p:stCondLst>
+                                  <p:childTnLst>
+                                    <p:set>
+                                      <p:cBhvr>
+                                        <p:cTn id="30" dur="1" fill="hold">
+                                          <p:stCondLst>
+                                            <p:cond delay="0"/>
+                                          </p:stCondLst>
+                                        </p:cTn>
+                                        <p:tgtEl>
+                                          <p:spTgt spid="3">
+                                            <p:txEl>
+                                              <p:pRg st="3" end="3"/>
+                                            </p:txEl>
+                                          </p:spTgt>
+                                        </p:tgtEl>
+                                        <p:attrNameLst>
+                                          <p:attrName>style.visibility</p:attrName>
+                                        </p:attrNameLst>
+                                      </p:cBhvr>
+                                      <p:to>
+                                        <p:strVal val="visible"/>
+                                      </p:to>
+                                    </p:set>
+                                    <p:animEffect transition="in" filter="fade">
+                                      <p:cBhvr>
+                                        <p:cTn id="31" dur="1000"/>
+                                        <p:tgtEl>
+                                          <p:spTgt spid="3">
+                                            <p:txEl>
+                                              <p:pRg st="3" end="3"/>
+                                            </p:txEl>
+                                          </p:spTgt>
+                                        </p:tgtEl>
+                                      </p:cBhvr>
+                                    </p:animEffect>
+                                    <p:anim calcmode="lin" valueType="num">
+                                      <p:cBhvr>
+                                        <p:cTn id="32" dur="1000" fill="hold"/>
+                                        <p:tgtEl>
+                                          <p:spTgt spid="3">
+                                            <p:txEl>
+                                              <p:pRg st="3" end="3"/>
+                                            </p:txEl>
+                                          </p:spTgt>
+                                        </p:tgtEl>
+                                        <p:attrNameLst>
+                                          <p:attrName>ppt_x</p:attrName>
+                                        </p:attrNameLst>
+                                      </p:cBhvr>
+                                      <p:tavLst>
+                                        <p:tav tm="0">
+                                          <p:val>
+                                            <p:strVal val="#ppt_x"/>
+                                          </p:val>
+                                        </p:tav>
+                                        <p:tav tm="100000">
+                                          <p:val>
+                                            <p:strVal val="#ppt_x"/>
+                                          </p:val>
+                                        </p:tav>
+                                      </p:tavLst>
+                                    </p:anim>
+                                    <p:anim calcmode="lin" valueType="num">
+                                      <p:cBhvr>
+                                        <p:cTn id="33" dur="1000" fill="hold"/>
+                                        <p:tgtEl>
+                                          <p:spTgt spid="3">
+                                            <p:txEl>
+                                              <p:pRg st="3" end="3"/>
+                                            </p:txEl>
+                                          </p:spTgt>
+                                        </p:tgtEl>
+                                        <p:attrNameLst>
+                                          <p:attrName>ppt_y</p:attrName>
+                                        </p:attrNameLst>
+                                      </p:cBhvr>
+                                      <p:tavLst>
+                                        <p:tav tm="0">
+                                          <p:val>
+                                            <p:strVal val="#ppt_y+.1"/>
+                                          </p:val>
+                                        </p:tav>
+                                        <p:tav tm="100000">
+                                          <p:val>
+                                            <p:strVal val="#ppt_y"/>
+                                          </p:val>
+                                        </p:tav>
+                                      </p:tavLst>
+                                    </p:anim>
+                                  </p:childTnLst>
+                                </p:cTn>
+                              </p:par>
+                            </p:childTnLst>
+                          </p:cTn>
+                        </p:par>
+                      </p:childTnLst>
+                    </p:cTn>
+                  </p:par>
+                  <p:par>
+                    <p:cTn id="34" fill="hold">
+                      <p:stCondLst>
+                        <p:cond delay="indefinite"/>
+                      </p:stCondLst>
+                      <p:childTnLst>
+                        <p:par>
+                          <p:cTn id="35" fill="hold">
+                            <p:stCondLst>
+                              <p:cond delay="0"/>
+                            </p:stCondLst>
+                            <p:childTnLst>
+                              <p:par>
+                                <p:cTn id="36" presetID="42" presetClass="entr" presetSubtype="0" fill="hold" grpId="0" nodeType="clickEffect">
+                                  <p:stCondLst>
+                                    <p:cond delay="0"/>
+                                  </p:stCondLst>
+                                  <p:childTnLst>
+                                    <p:set>
+                                      <p:cBhvr>
+                                        <p:cTn id="37" dur="1" fill="hold">
+                                          <p:stCondLst>
+                                            <p:cond delay="0"/>
+                                          </p:stCondLst>
+                                        </p:cTn>
+                                        <p:tgtEl>
+                                          <p:spTgt spid="3">
+                                            <p:txEl>
+                                              <p:pRg st="4" end="4"/>
+                                            </p:txEl>
+                                          </p:spTgt>
+                                        </p:tgtEl>
+                                        <p:attrNameLst>
+                                          <p:attrName>style.visibility</p:attrName>
+                                        </p:attrNameLst>
+                                      </p:cBhvr>
+                                      <p:to>
+                                        <p:strVal val="visible"/>
+                                      </p:to>
+                                    </p:set>
+                                    <p:animEffect transition="in" filter="fade">
+                                      <p:cBhvr>
+                                        <p:cTn id="38" dur="1000"/>
+                                        <p:tgtEl>
+                                          <p:spTgt spid="3">
+                                            <p:txEl>
+                                              <p:pRg st="4" end="4"/>
+                                            </p:txEl>
+                                          </p:spTgt>
+                                        </p:tgtEl>
+                                      </p:cBhvr>
+                                    </p:animEffect>
+                                    <p:anim calcmode="lin" valueType="num">
+                                      <p:cBhvr>
+                                        <p:cTn id="39" dur="1000" fill="hold"/>
+                                        <p:tgtEl>
+                                          <p:spTgt spid="3">
+                                            <p:txEl>
+                                              <p:pRg st="4" end="4"/>
+                                            </p:txEl>
+                                          </p:spTgt>
+                                        </p:tgtEl>
+                                        <p:attrNameLst>
+                                          <p:attrName>ppt_x</p:attrName>
+                                        </p:attrNameLst>
+                                      </p:cBhvr>
+                                      <p:tavLst>
+                                        <p:tav tm="0">
+                                          <p:val>
+                                            <p:strVal val="#ppt_x"/>
+                                          </p:val>
+                                        </p:tav>
+                                        <p:tav tm="100000">
+                                          <p:val>
+                                            <p:strVal val="#ppt_x"/>
+                                          </p:val>
+                                        </p:tav>
+                                      </p:tavLst>
+                                    </p:anim>
+                                    <p:anim calcmode="lin" valueType="num">
+                                      <p:cBhvr>
+                                        <p:cTn id="40" dur="1000" fill="hold"/>
+                                        <p:tgtEl>
+                                          <p:spTgt spid="3">
+                                            <p:txEl>
+                                              <p:pRg st="4" end="4"/>
+                                            </p:txEl>
+                                          </p:spTgt>
+                                        </p:tgtEl>
+                                        <p:attrNameLst>
+                                          <p:attrName>ppt_y</p:attrName>
+                                        </p:attrNameLst>
+                                      </p:cBhvr>
+                                      <p:tavLst>
+                                        <p:tav tm="0">
+                                          <p:val>
+                                            <p:strVal val="#ppt_y+.1"/>
+                                          </p:val>
+                                        </p:tav>
+                                        <p:tav tm="100000">
+                                          <p:val>
+                                            <p:strVal val="#ppt_y"/>
+                                          </p:val>
+                                        </p:tav>
+                                      </p:tavLst>
+                                    </p:anim>
+                                  </p:childTnLst>
+                                </p:cTn>
+                              </p:par>
+                            </p:childTnLst>
+                          </p:cTn>
+                        </p:par>
+                      </p:childTnLst>
+                    </p:cTn>
+                  </p:par>
+                  <p:par>
+                    <p:cTn id="41" fill="hold">
+                      <p:stCondLst>
+                        <p:cond delay="indefinite"/>
+                      </p:stCondLst>
+                      <p:childTnLst>
+                        <p:par>
+                          <p:cTn id="42" fill="hold">
+                            <p:stCondLst>
+                              <p:cond delay="0"/>
+                            </p:stCondLst>
+                            <p:childTnLst>
+                              <p:par>
+                                <p:cTn id="43" presetID="42" presetClass="entr" presetSubtype="0" fill="hold" grpId="0" nodeType="clickEffect">
+                                  <p:stCondLst>
+                                    <p:cond delay="0"/>
+                                  </p:stCondLst>
+                                  <p:childTnLst>
+                                    <p:set>
+                                      <p:cBhvr>
+                                        <p:cTn id="44" dur="1" fill="hold">
+                                          <p:stCondLst>
+                                            <p:cond delay="0"/>
+                                          </p:stCondLst>
+                                        </p:cTn>
+                                        <p:tgtEl>
+                                          <p:spTgt spid="3">
+                                            <p:txEl>
+                                              <p:pRg st="5" end="5"/>
+                                            </p:txEl>
+                                          </p:spTgt>
+                                        </p:tgtEl>
+                                        <p:attrNameLst>
+                                          <p:attrName>style.visibility</p:attrName>
+                                        </p:attrNameLst>
+                                      </p:cBhvr>
+                                      <p:to>
+                                        <p:strVal val="visible"/>
+                                      </p:to>
+                                    </p:set>
+                                    <p:animEffect transition="in" filter="fade">
+                                      <p:cBhvr>
+                                        <p:cTn id="45" dur="1000"/>
+                                        <p:tgtEl>
+                                          <p:spTgt spid="3">
+                                            <p:txEl>
+                                              <p:pRg st="5" end="5"/>
+                                            </p:txEl>
+                                          </p:spTgt>
+                                        </p:tgtEl>
+                                      </p:cBhvr>
+                                    </p:animEffect>
+                                    <p:anim calcmode="lin" valueType="num">
+                                      <p:cBhvr>
+                                        <p:cTn id="46" dur="1000" fill="hold"/>
+                                        <p:tgtEl>
+                                          <p:spTgt spid="3">
+                                            <p:txEl>
+                                              <p:pRg st="5" end="5"/>
+                                            </p:txEl>
+                                          </p:spTgt>
+                                        </p:tgtEl>
+                                        <p:attrNameLst>
+                                          <p:attrName>ppt_x</p:attrName>
+                                        </p:attrNameLst>
+                                      </p:cBhvr>
+                                      <p:tavLst>
+                                        <p:tav tm="0">
+                                          <p:val>
+                                            <p:strVal val="#ppt_x"/>
+                                          </p:val>
+                                        </p:tav>
+                                        <p:tav tm="100000">
+                                          <p:val>
+                                            <p:strVal val="#ppt_x"/>
+                                          </p:val>
+                                        </p:tav>
+                                      </p:tavLst>
+                                    </p:anim>
+                                    <p:anim calcmode="lin" valueType="num">
+                                      <p:cBhvr>
+                                        <p:cTn id="47" dur="1000" fill="hold"/>
+                                        <p:tgtEl>
+                                          <p:spTgt spid="3">
+                                            <p:txEl>
+                                              <p:pRg st="5" end="5"/>
+                                            </p:txEl>
+                                          </p:spTgt>
+                                        </p:tgtEl>
+                                        <p:attrNameLst>
+                                          <p:attrName>ppt_y</p:attrName>
+                                        </p:attrNameLst>
+                                      </p:cBhvr>
+                                      <p:tavLst>
+                                        <p:tav tm="0">
+                                          <p:val>
+                                            <p:strVal val="#ppt_y+.1"/>
+                                          </p:val>
+                                        </p:tav>
+                                        <p:tav tm="100000">
+                                          <p:val>
+                                            <p:strVal val="#ppt_y"/>
+                                          </p:val>
+                                        </p:tav>
+                                      </p:tavLst>
+                                    </p:anim>
+                                  </p:childTnLst>
+                                </p:cTn>
+                              </p:par>
+                            </p:childTnLst>
+                          </p:cTn>
+                        </p:par>
+                      </p:childTnLst>
+                    </p:cTn>
+                  </p:par>
+                  <p:par>
+                    <p:cTn id="48" fill="hold">
+                      <p:stCondLst>
+                        <p:cond delay="indefinite"/>
+                      </p:stCondLst>
+                      <p:childTnLst>
+                        <p:par>
+                          <p:cTn id="49" fill="hold">
+                            <p:stCondLst>
+                              <p:cond delay="0"/>
+                            </p:stCondLst>
+                            <p:childTnLst>
+                              <p:par>
+                                <p:cTn id="50" presetID="42" presetClass="entr" presetSubtype="0" fill="hold" grpId="0" nodeType="clickEffect">
+                                  <p:stCondLst>
+                                    <p:cond delay="0"/>
+                                  </p:stCondLst>
+                                  <p:childTnLst>
+                                    <p:set>
+                                      <p:cBhvr>
+                                        <p:cTn id="51" dur="1" fill="hold">
+                                          <p:stCondLst>
+                                            <p:cond delay="0"/>
+                                          </p:stCondLst>
+                                        </p:cTn>
+                                        <p:tgtEl>
+                                          <p:spTgt spid="3">
+                                            <p:txEl>
+                                              <p:pRg st="6" end="6"/>
+                                            </p:txEl>
+                                          </p:spTgt>
+                                        </p:tgtEl>
+                                        <p:attrNameLst>
+                                          <p:attrName>style.visibility</p:attrName>
+                                        </p:attrNameLst>
+                                      </p:cBhvr>
+                                      <p:to>
+                                        <p:strVal val="visible"/>
+                                      </p:to>
+                                    </p:set>
+                                    <p:animEffect transition="in" filter="fade">
+                                      <p:cBhvr>
+                                        <p:cTn id="52" dur="1000"/>
+                                        <p:tgtEl>
+                                          <p:spTgt spid="3">
+                                            <p:txEl>
+                                              <p:pRg st="6" end="6"/>
+                                            </p:txEl>
+                                          </p:spTgt>
+                                        </p:tgtEl>
+                                      </p:cBhvr>
+                                    </p:animEffect>
+                                    <p:anim calcmode="lin" valueType="num">
+                                      <p:cBhvr>
+                                        <p:cTn id="53" dur="1000" fill="hold"/>
+                                        <p:tgtEl>
+                                          <p:spTgt spid="3">
+                                            <p:txEl>
+                                              <p:pRg st="6" end="6"/>
+                                            </p:txEl>
+                                          </p:spTgt>
+                                        </p:tgtEl>
+                                        <p:attrNameLst>
+                                          <p:attrName>ppt_x</p:attrName>
+                                        </p:attrNameLst>
+                                      </p:cBhvr>
+                                      <p:tavLst>
+                                        <p:tav tm="0">
+                                          <p:val>
+                                            <p:strVal val="#ppt_x"/>
+                                          </p:val>
+                                        </p:tav>
+                                        <p:tav tm="100000">
+                                          <p:val>
+                                            <p:strVal val="#ppt_x"/>
+                                          </p:val>
+                                        </p:tav>
+                                      </p:tavLst>
+                                    </p:anim>
+                                    <p:anim calcmode="lin" valueType="num">
+                                      <p:cBhvr>
+                                        <p:cTn id="54" dur="1000" fill="hold"/>
+                                        <p:tgtEl>
+                                          <p:spTgt spid="3">
+                                            <p:txEl>
+                                              <p:pRg st="6" end="6"/>
+                                            </p:txEl>
+                                          </p:spTgt>
+                                        </p:tgtEl>
+                                        <p:attrNameLst>
+                                          <p:attrName>ppt_y</p:attrName>
+                                        </p:attrNameLst>
+                                      </p:cBhvr>
+                                      <p:tavLst>
+                                        <p:tav tm="0">
+                                          <p:val>
+                                            <p:strVal val="#ppt_y+.1"/>
+                                          </p:val>
+                                        </p:tav>
+                                        <p:tav tm="100000">
+                                          <p:val>
+                                            <p:strVal val="#ppt_y"/>
+                                          </p:val>
+                                        </p:tav>
+                                      </p:tavLst>
+                                    </p:anim>
+                                  </p:childTnLst>
+                                </p:cTn>
+                              </p:par>
+                            </p:childTnLst>
+                          </p:cTn>
+                        </p:par>
+                      </p:childTnLst>
+                    </p:cTn>
+                  </p:par>
+                  <p:par>
+                    <p:cTn id="55" fill="hold">
+                      <p:stCondLst>
+                        <p:cond delay="indefinite"/>
+                      </p:stCondLst>
+                      <p:childTnLst>
+                        <p:par>
+                          <p:cTn id="56" fill="hold">
+                            <p:stCondLst>
+                              <p:cond delay="0"/>
+                            </p:stCondLst>
+                            <p:childTnLst>
+                              <p:par>
+                                <p:cTn id="57" presetID="42" presetClass="entr" presetSubtype="0" fill="hold" grpId="0" nodeType="clickEffect">
+                                  <p:stCondLst>
+                                    <p:cond delay="0"/>
+                                  </p:stCondLst>
+                                  <p:childTnLst>
+                                    <p:set>
+                                      <p:cBhvr>
+                                        <p:cTn id="58" dur="1" fill="hold">
+                                          <p:stCondLst>
+                                            <p:cond delay="0"/>
+                                          </p:stCondLst>
+                                        </p:cTn>
+                                        <p:tgtEl>
+                                          <p:spTgt spid="3">
+                                            <p:txEl>
+                                              <p:pRg st="7" end="7"/>
+                                            </p:txEl>
+                                          </p:spTgt>
+                                        </p:tgtEl>
+                                        <p:attrNameLst>
+                                          <p:attrName>style.visibility</p:attrName>
+                                        </p:attrNameLst>
+                                      </p:cBhvr>
+                                      <p:to>
+                                        <p:strVal val="visible"/>
+                                      </p:to>
+                                    </p:set>
+                                    <p:animEffect transition="in" filter="fade">
+                                      <p:cBhvr>
+                                        <p:cTn id="59" dur="1000"/>
+                                        <p:tgtEl>
+                                          <p:spTgt spid="3">
+                                            <p:txEl>
+                                              <p:pRg st="7" end="7"/>
+                                            </p:txEl>
+                                          </p:spTgt>
+                                        </p:tgtEl>
+                                      </p:cBhvr>
+                                    </p:animEffect>
+                                    <p:anim calcmode="lin" valueType="num">
+                                      <p:cBhvr>
+                                        <p:cTn id="60" dur="1000" fill="hold"/>
+                                        <p:tgtEl>
+                                          <p:spTgt spid="3">
+                                            <p:txEl>
+                                              <p:pRg st="7" end="7"/>
+                                            </p:txEl>
+                                          </p:spTgt>
+                                        </p:tgtEl>
+                                        <p:attrNameLst>
+                                          <p:attrName>ppt_x</p:attrName>
+                                        </p:attrNameLst>
+                                      </p:cBhvr>
+                                      <p:tavLst>
+                                        <p:tav tm="0">
+                                          <p:val>
+                                            <p:strVal val="#ppt_x"/>
+                                          </p:val>
+                                        </p:tav>
+                                        <p:tav tm="100000">
+                                          <p:val>
+                                            <p:strVal val="#ppt_x"/>
+                                          </p:val>
+                                        </p:tav>
+                                      </p:tavLst>
+                                    </p:anim>
+                                    <p:anim calcmode="lin" valueType="num">
+                                      <p:cBhvr>
+                                        <p:cTn id="61" dur="1000" fill="hold"/>
+                                        <p:tgtEl>
+                                          <p:spTgt spid="3">
+                                            <p:txEl>
+                                              <p:pRg st="7" end="7"/>
+                                            </p:txEl>
+                                          </p:spTgt>
+                                        </p:tgtEl>
+                                        <p:attrNameLst>
+                                          <p:attrName>ppt_y</p:attrName>
+                                        </p:attrNameLst>
+                                      </p:cBhvr>
+                                      <p:tavLst>
+                                        <p:tav tm="0">
+                                          <p:val>
+                                            <p:strVal val="#ppt_y+.1"/>
+                                          </p:val>
+                                        </p:tav>
+                                        <p:tav tm="100000">
+                                          <p:val>
+                                            <p:strVal val="#ppt_y"/>
+                                          </p:val>
+                                        </p:tav>
+                                      </p:tavLst>
+                                    </p:anim>
+                                  </p:childTnLst>
+                                </p:cTn>
+                              </p:par>
+                            </p:childTnLst>
+                          </p:cTn>
+                        </p:par>
+                      </p:childTnLst>
+                    </p:cTn>
+                  </p:par>
+                  <p:par>
+                    <p:cTn id="62" fill="hold">
+                      <p:stCondLst>
+                        <p:cond delay="indefinite"/>
+                      </p:stCondLst>
+                      <p:childTnLst>
+                        <p:par>
+                          <p:cTn id="63" fill="hold">
+                            <p:stCondLst>
+                              <p:cond delay="0"/>
+                            </p:stCondLst>
+                            <p:childTnLst>
+                              <p:par>
+                                <p:cTn id="64" presetID="42" presetClass="entr" presetSubtype="0" fill="hold" grpId="0" nodeType="clickEffect">
+                                  <p:stCondLst>
+                                    <p:cond delay="0"/>
+                                  </p:stCondLst>
+                                  <p:childTnLst>
+                                    <p:set>
+                                      <p:cBhvr>
+                                        <p:cTn id="65" dur="1" fill="hold">
+                                          <p:stCondLst>
+                                            <p:cond delay="0"/>
+                                          </p:stCondLst>
+                                        </p:cTn>
+                                        <p:tgtEl>
+                                          <p:spTgt spid="3">
+                                            <p:txEl>
+                                              <p:pRg st="8" end="8"/>
+                                            </p:txEl>
+                                          </p:spTgt>
+                                        </p:tgtEl>
+                                        <p:attrNameLst>
+                                          <p:attrName>style.visibility</p:attrName>
+                                        </p:attrNameLst>
+                                      </p:cBhvr>
+                                      <p:to>
+                                        <p:strVal val="visible"/>
+                                      </p:to>
+                                    </p:set>
+                                    <p:animEffect transition="in" filter="fade">
+                                      <p:cBhvr>
+                                        <p:cTn id="66" dur="1000"/>
+                                        <p:tgtEl>
+                                          <p:spTgt spid="3">
+                                            <p:txEl>
+                                              <p:pRg st="8" end="8"/>
+                                            </p:txEl>
+                                          </p:spTgt>
+                                        </p:tgtEl>
+                                      </p:cBhvr>
+                                    </p:animEffect>
+                                    <p:anim calcmode="lin" valueType="num">
+                                      <p:cBhvr>
+                                        <p:cTn id="67" dur="1000" fill="hold"/>
+                                        <p:tgtEl>
+                                          <p:spTgt spid="3">
+                                            <p:txEl>
+                                              <p:pRg st="8" end="8"/>
+                                            </p:txEl>
+                                          </p:spTgt>
+                                        </p:tgtEl>
+                                        <p:attrNameLst>
+                                          <p:attrName>ppt_x</p:attrName>
+                                        </p:attrNameLst>
+                                      </p:cBhvr>
+                                      <p:tavLst>
+                                        <p:tav tm="0">
+                                          <p:val>
+                                            <p:strVal val="#ppt_x"/>
+                                          </p:val>
+                                        </p:tav>
+                                        <p:tav tm="100000">
+                                          <p:val>
+                                            <p:strVal val="#ppt_x"/>
+                                          </p:val>
+                                        </p:tav>
+                                      </p:tavLst>
+                                    </p:anim>
+                                    <p:anim calcmode="lin" valueType="num">
+                                      <p:cBhvr>
+                                        <p:cTn id="68" dur="1000" fill="hold"/>
+                                        <p:tgtEl>
+                                          <p:spTgt spid="3">
+                                            <p:txEl>
+                                              <p:pRg st="8" end="8"/>
+                                            </p:txEl>
+                                          </p:spTgt>
+                                        </p:tgtEl>
+                                        <p:attrNameLst>
+                                          <p:attrName>ppt_y</p:attrName>
+                                        </p:attrNameLst>
+                                      </p:cBhvr>
+                                      <p:tavLst>
+                                        <p:tav tm="0">
+                                          <p:val>
+                                            <p:strVal val="#ppt_y+.1"/>
+                                          </p:val>
+                                        </p:tav>
+                                        <p:tav tm="100000">
+                                          <p:val>
+                                            <p:strVal val="#ppt_y"/>
+                                          </p:val>
+                                        </p:tav>
+                                      </p:tavLst>
+                                    </p:anim>
+                                  </p:childTnLst>
+                                </p:cTn>
+                              </p:par>
+                            </p:childTnLst>
+                          </p:cTn>
+                        </p:par>
+                      </p:childTnLst>
+                    </p:cTn>
+                  </p:par>
+                  <p:par>
+                    <p:cTn id="69" fill="hold">
+                      <p:stCondLst>
+                        <p:cond delay="indefinite"/>
+                      </p:stCondLst>
+                      <p:childTnLst>
+                        <p:par>
+                          <p:cTn id="70" fill="hold">
+                            <p:stCondLst>
+                              <p:cond delay="0"/>
+                            </p:stCondLst>
+                            <p:childTnLst>
+                              <p:par>
+                                <p:cTn id="71" presetID="42" presetClass="entr" presetSubtype="0" fill="hold" grpId="0" nodeType="clickEffect">
+                                  <p:stCondLst>
+                                    <p:cond delay="0"/>
+                                  </p:stCondLst>
+                                  <p:childTnLst>
+                                    <p:set>
+                                      <p:cBhvr>
+                                        <p:cTn id="72" dur="1" fill="hold">
+                                          <p:stCondLst>
+                                            <p:cond delay="0"/>
+                                          </p:stCondLst>
+                                        </p:cTn>
+                                        <p:tgtEl>
+                                          <p:spTgt spid="3">
+                                            <p:txEl>
+                                              <p:pRg st="9" end="9"/>
+                                            </p:txEl>
+                                          </p:spTgt>
+                                        </p:tgtEl>
+                                        <p:attrNameLst>
+                                          <p:attrName>style.visibility</p:attrName>
+                                        </p:attrNameLst>
+                                      </p:cBhvr>
+                                      <p:to>
+                                        <p:strVal val="visible"/>
+                                      </p:to>
+                                    </p:set>
+                                    <p:animEffect transition="in" filter="fade">
+                                      <p:cBhvr>
+                                        <p:cTn id="73" dur="1000"/>
+                                        <p:tgtEl>
+                                          <p:spTgt spid="3">
+                                            <p:txEl>
+                                              <p:pRg st="9" end="9"/>
+                                            </p:txEl>
+                                          </p:spTgt>
+                                        </p:tgtEl>
+                                      </p:cBhvr>
+                                    </p:animEffect>
+                                    <p:anim calcmode="lin" valueType="num">
+                                      <p:cBhvr>
+                                        <p:cTn id="74" dur="1000" fill="hold"/>
+                                        <p:tgtEl>
+                                          <p:spTgt spid="3">
+                                            <p:txEl>
+                                              <p:pRg st="9" end="9"/>
+                                            </p:txEl>
+                                          </p:spTgt>
+                                        </p:tgtEl>
+                                        <p:attrNameLst>
+                                          <p:attrName>ppt_x</p:attrName>
+                                        </p:attrNameLst>
+                                      </p:cBhvr>
+                                      <p:tavLst>
+                                        <p:tav tm="0">
+                                          <p:val>
+                                            <p:strVal val="#ppt_x"/>
+                                          </p:val>
+                                        </p:tav>
+                                        <p:tav tm="100000">
+                                          <p:val>
+                                            <p:strVal val="#ppt_x"/>
+                                          </p:val>
+                                        </p:tav>
+                                      </p:tavLst>
+                                    </p:anim>
+                                    <p:anim calcmode="lin" valueType="num">
+                                      <p:cBhvr>
+                                        <p:cTn id="75" dur="1000" fill="hold"/>
+                                        <p:tgtEl>
+                                          <p:spTgt spid="3">
+                                            <p:txEl>
+                                              <p:pRg st="9" end="9"/>
+                                            </p:txEl>
+                                          </p:spTgt>
+                                        </p:tgtEl>
+                                        <p:attrNameLst>
+                                          <p:attrName>ppt_y</p:attrName>
+                                        </p:attrNameLst>
+                                      </p:cBhvr>
+                                      <p:tavLst>
+                                        <p:tav tm="0">
+                                          <p:val>
+                                            <p:strVal val="#ppt_y+.1"/>
+                                          </p:val>
+                                        </p:tav>
+                                        <p:tav tm="100000">
+                                          <p:val>
+                                            <p:strVal val="#ppt_y"/>
+                                          </p:val>
+                                        </p:tav>
+                                      </p:tavLst>
+                                    </p:anim>
+                                  </p:childTnLst>
+                                </p:cTn>
+                              </p:par>
+                            </p:childTnLst>
+                          </p:cTn>
+                        </p:par>
+                      </p:childTnLst>
+                    </p:cTn>
+                  </p:par>
+                  <p:par>
+                    <p:cTn id="76" fill="hold">
+                      <p:stCondLst>
+                        <p:cond delay="indefinite"/>
+                      </p:stCondLst>
+                      <p:childTnLst>
+                        <p:par>
+                          <p:cTn id="77" fill="hold">
+                            <p:stCondLst>
+                              <p:cond delay="0"/>
+                            </p:stCondLst>
+                            <p:childTnLst>
+                              <p:par>
+                                <p:cTn id="78" presetID="42" presetClass="entr" presetSubtype="0" fill="hold" grpId="0" nodeType="clickEffect">
+                                  <p:stCondLst>
+                                    <p:cond delay="0"/>
+                                  </p:stCondLst>
+                                  <p:childTnLst>
+                                    <p:set>
+                                      <p:cBhvr>
+                                        <p:cTn id="79" dur="1" fill="hold">
+                                          <p:stCondLst>
+                                            <p:cond delay="0"/>
+                                          </p:stCondLst>
+                                        </p:cTn>
+                                        <p:tgtEl>
+                                          <p:spTgt spid="3">
+                                            <p:txEl>
+                                              <p:pRg st="10" end="10"/>
+                                            </p:txEl>
+                                          </p:spTgt>
+                                        </p:tgtEl>
+                                        <p:attrNameLst>
+                                          <p:attrName>style.visibility</p:attrName>
+                                        </p:attrNameLst>
+                                      </p:cBhvr>
+                                      <p:to>
+                                        <p:strVal val="visible"/>
+                                      </p:to>
+                                    </p:set>
+                                    <p:animEffect transition="in" filter="fade">
+                                      <p:cBhvr>
+                                        <p:cTn id="80" dur="1000"/>
+                                        <p:tgtEl>
+                                          <p:spTgt spid="3">
+                                            <p:txEl>
+                                              <p:pRg st="10" end="10"/>
+                                            </p:txEl>
+                                          </p:spTgt>
+                                        </p:tgtEl>
+                                      </p:cBhvr>
+                                    </p:animEffect>
+                                    <p:anim calcmode="lin" valueType="num">
+                                      <p:cBhvr>
+                                        <p:cTn id="81" dur="1000" fill="hold"/>
+                                        <p:tgtEl>
+                                          <p:spTgt spid="3">
+                                            <p:txEl>
+                                              <p:pRg st="10" end="10"/>
+                                            </p:txEl>
+                                          </p:spTgt>
+                                        </p:tgtEl>
+                                        <p:attrNameLst>
+                                          <p:attrName>ppt_x</p:attrName>
+                                        </p:attrNameLst>
+                                      </p:cBhvr>
+                                      <p:tavLst>
+                                        <p:tav tm="0">
+                                          <p:val>
+                                            <p:strVal val="#ppt_x"/>
+                                          </p:val>
+                                        </p:tav>
+                                        <p:tav tm="100000">
+                                          <p:val>
+                                            <p:strVal val="#ppt_x"/>
+                                          </p:val>
+                                        </p:tav>
+                                      </p:tavLst>
+                                    </p:anim>
+                                    <p:anim calcmode="lin" valueType="num">
+                                      <p:cBhvr>
+                                        <p:cTn id="82" dur="1000" fill="hold"/>
+                                        <p:tgtEl>
+                                          <p:spTgt spid="3">
+                                            <p:txEl>
+                                              <p:pRg st="10" end="10"/>
+                                            </p:txEl>
+                                          </p:spTgt>
+                                        </p:tgtEl>
+                                        <p:attrNameLst>
+                                          <p:attrName>ppt_y</p:attrName>
+                                        </p:attrNameLst>
+                                      </p:cBhvr>
+                                      <p:tavLst>
+                                        <p:tav tm="0">
+                                          <p:val>
+                                            <p:strVal val="#ppt_y+.1"/>
+                                          </p:val>
+                                        </p:tav>
+                                        <p:tav tm="100000">
+                                          <p:val>
+                                            <p:strVal val="#ppt_y"/>
+                                          </p:val>
+                                        </p:tav>
+                                      </p:tavLst>
+                                    </p:anim>
+                                  </p:childTnLst>
+                                </p:cTn>
+                              </p:par>
+                            </p:childTnLst>
+                          </p:cTn>
+                        </p:par>
+                      </p:childTnLst>
+                    </p:cTn>
+                  </p:par>
+                </p:childTnLst>
+              </p:cTn>
+              <p:prevCondLst>
+                <p:cond evt="onPrev" delay="0">
+                  <p:tgtEl>
+                    <p:sldTgt/>
+                  </p:tgtEl>
+                </p:cond>
+              </p:prevCondLst>
+              <p:nextCondLst>
+                <p:cond evt="onNext" delay="0">
+                  <p:tgtEl>
+                    <p:sldTgt/>
+                  </p:tgtEl>
+                </p:cond>
+              </p:nextCondLst>
+            </p:seq>
+          </p:childTnLst>
+        </p:cTn>
+      </p:par>
+    </p:tnLst>
+    <p:bldLst>
+      <p:bldP spid="2" grpId="0"/>
+      <p:bldP spid="3" grpId="0" uiExpand="1" build="p"/>
+    </p:bldLst>
+  </p:timing>
 </p:sld>
 </file>
 
@@ -5930,39 +7298,355 @@
           <a:bodyPr/>
           <a:lstStyle/>
           <a:p>
-            <a:endParaRPr lang="en-GB"/>
-          </a:p>
-        </p:txBody>
-      </p:sp>
-      <p:sp>
-        <p:nvSpPr>
-          <p:cNvPr id="3" name="Content Placeholder 2">
+            <a:r>
+              <a:rPr lang="en-GB" dirty="0"/>
+              <a:t>Current State Of the project</a:t>
+            </a:r>
+          </a:p>
+        </p:txBody>
+      </p:sp>
+      <p:pic>
+        <p:nvPicPr>
+          <p:cNvPr id="5" name="Content Placeholder 4">
             <a:extLst>
               <a:ext uri="{FF2B5EF4-FFF2-40B4-BE49-F238E27FC236}">
-                <a16:creationId xmlns:a16="http://schemas.microsoft.com/office/drawing/2014/main" id="{CCC5CDE0-A74E-4514-A656-E9FFBA4BFD92}"/>
+                <a16:creationId xmlns:a16="http://schemas.microsoft.com/office/drawing/2014/main" id="{219B29FF-C113-4312-A0E4-97295522A019}"/>
               </a:ext>
             </a:extLst>
           </p:cNvPr>
-          <p:cNvSpPr>
-            <a:spLocks noGrp="1"/>
-          </p:cNvSpPr>
+          <p:cNvPicPr>
+            <a:picLocks noGrp="1" noChangeAspect="1"/>
+          </p:cNvPicPr>
           <p:nvPr>
             <p:ph idx="1"/>
           </p:nvPr>
-        </p:nvSpPr>
-        <p:spPr/>
-        <p:txBody>
-          <a:bodyPr/>
-          <a:lstStyle/>
-          <a:p>
-            <a:endParaRPr lang="en-GB"/>
-          </a:p>
-        </p:txBody>
-      </p:sp>
+        </p:nvPicPr>
+        <p:blipFill>
+          <a:blip r:embed="rId2"/>
+          <a:stretch>
+            <a:fillRect/>
+          </a:stretch>
+        </p:blipFill>
+        <p:spPr>
+          <a:xfrm>
+            <a:off x="3366715" y="2193925"/>
+            <a:ext cx="5458570" cy="4024313"/>
+          </a:xfrm>
+        </p:spPr>
+      </p:pic>
     </p:spTree>
     <p:extLst>
       <p:ext uri="{BB962C8B-B14F-4D97-AF65-F5344CB8AC3E}">
         <p14:creationId xmlns:p14="http://schemas.microsoft.com/office/powerpoint/2010/main" val="4267072192"/>
+      </p:ext>
+    </p:extLst>
+  </p:cSld>
+  <p:clrMapOvr>
+    <a:masterClrMapping/>
+  </p:clrMapOvr>
+  <p:timing>
+    <p:tnLst>
+      <p:par>
+        <p:cTn id="1" dur="indefinite" restart="never" nodeType="tmRoot">
+          <p:childTnLst>
+            <p:seq concurrent="1" nextAc="seek">
+              <p:cTn id="2" dur="indefinite" nodeType="mainSeq">
+                <p:childTnLst>
+                  <p:par>
+                    <p:cTn id="3" fill="hold">
+                      <p:stCondLst>
+                        <p:cond delay="indefinite"/>
+                      </p:stCondLst>
+                      <p:childTnLst>
+                        <p:par>
+                          <p:cTn id="4" fill="hold">
+                            <p:stCondLst>
+                              <p:cond delay="0"/>
+                            </p:stCondLst>
+                            <p:childTnLst>
+                              <p:par>
+                                <p:cTn id="5" presetID="2" presetClass="entr" presetSubtype="4" fill="hold" grpId="0" nodeType="clickEffect">
+                                  <p:stCondLst>
+                                    <p:cond delay="0"/>
+                                  </p:stCondLst>
+                                  <p:childTnLst>
+                                    <p:set>
+                                      <p:cBhvr>
+                                        <p:cTn id="6" dur="1" fill="hold">
+                                          <p:stCondLst>
+                                            <p:cond delay="0"/>
+                                          </p:stCondLst>
+                                        </p:cTn>
+                                        <p:tgtEl>
+                                          <p:spTgt spid="2"/>
+                                        </p:tgtEl>
+                                        <p:attrNameLst>
+                                          <p:attrName>style.visibility</p:attrName>
+                                        </p:attrNameLst>
+                                      </p:cBhvr>
+                                      <p:to>
+                                        <p:strVal val="visible"/>
+                                      </p:to>
+                                    </p:set>
+                                    <p:anim calcmode="lin" valueType="num">
+                                      <p:cBhvr additive="base">
+                                        <p:cTn id="7" dur="500" fill="hold"/>
+                                        <p:tgtEl>
+                                          <p:spTgt spid="2"/>
+                                        </p:tgtEl>
+                                        <p:attrNameLst>
+                                          <p:attrName>ppt_x</p:attrName>
+                                        </p:attrNameLst>
+                                      </p:cBhvr>
+                                      <p:tavLst>
+                                        <p:tav tm="0">
+                                          <p:val>
+                                            <p:strVal val="#ppt_x"/>
+                                          </p:val>
+                                        </p:tav>
+                                        <p:tav tm="100000">
+                                          <p:val>
+                                            <p:strVal val="#ppt_x"/>
+                                          </p:val>
+                                        </p:tav>
+                                      </p:tavLst>
+                                    </p:anim>
+                                    <p:anim calcmode="lin" valueType="num">
+                                      <p:cBhvr additive="base">
+                                        <p:cTn id="8" dur="500" fill="hold"/>
+                                        <p:tgtEl>
+                                          <p:spTgt spid="2"/>
+                                        </p:tgtEl>
+                                        <p:attrNameLst>
+                                          <p:attrName>ppt_y</p:attrName>
+                                        </p:attrNameLst>
+                                      </p:cBhvr>
+                                      <p:tavLst>
+                                        <p:tav tm="0">
+                                          <p:val>
+                                            <p:strVal val="1+#ppt_h/2"/>
+                                          </p:val>
+                                        </p:tav>
+                                        <p:tav tm="100000">
+                                          <p:val>
+                                            <p:strVal val="#ppt_y"/>
+                                          </p:val>
+                                        </p:tav>
+                                      </p:tavLst>
+                                    </p:anim>
+                                  </p:childTnLst>
+                                </p:cTn>
+                              </p:par>
+                            </p:childTnLst>
+                          </p:cTn>
+                        </p:par>
+                      </p:childTnLst>
+                    </p:cTn>
+                  </p:par>
+                  <p:par>
+                    <p:cTn id="9" fill="hold">
+                      <p:stCondLst>
+                        <p:cond delay="indefinite"/>
+                      </p:stCondLst>
+                      <p:childTnLst>
+                        <p:par>
+                          <p:cTn id="10" fill="hold">
+                            <p:stCondLst>
+                              <p:cond delay="0"/>
+                            </p:stCondLst>
+                            <p:childTnLst>
+                              <p:par>
+                                <p:cTn id="11" presetID="2" presetClass="entr" presetSubtype="4" fill="hold" nodeType="clickEffect">
+                                  <p:stCondLst>
+                                    <p:cond delay="0"/>
+                                  </p:stCondLst>
+                                  <p:childTnLst>
+                                    <p:set>
+                                      <p:cBhvr>
+                                        <p:cTn id="12" dur="1" fill="hold">
+                                          <p:stCondLst>
+                                            <p:cond delay="0"/>
+                                          </p:stCondLst>
+                                        </p:cTn>
+                                        <p:tgtEl>
+                                          <p:spTgt spid="5"/>
+                                        </p:tgtEl>
+                                        <p:attrNameLst>
+                                          <p:attrName>style.visibility</p:attrName>
+                                        </p:attrNameLst>
+                                      </p:cBhvr>
+                                      <p:to>
+                                        <p:strVal val="visible"/>
+                                      </p:to>
+                                    </p:set>
+                                    <p:anim calcmode="lin" valueType="num">
+                                      <p:cBhvr additive="base">
+                                        <p:cTn id="13" dur="500" fill="hold"/>
+                                        <p:tgtEl>
+                                          <p:spTgt spid="5"/>
+                                        </p:tgtEl>
+                                        <p:attrNameLst>
+                                          <p:attrName>ppt_x</p:attrName>
+                                        </p:attrNameLst>
+                                      </p:cBhvr>
+                                      <p:tavLst>
+                                        <p:tav tm="0">
+                                          <p:val>
+                                            <p:strVal val="#ppt_x"/>
+                                          </p:val>
+                                        </p:tav>
+                                        <p:tav tm="100000">
+                                          <p:val>
+                                            <p:strVal val="#ppt_x"/>
+                                          </p:val>
+                                        </p:tav>
+                                      </p:tavLst>
+                                    </p:anim>
+                                    <p:anim calcmode="lin" valueType="num">
+                                      <p:cBhvr additive="base">
+                                        <p:cTn id="14" dur="500" fill="hold"/>
+                                        <p:tgtEl>
+                                          <p:spTgt spid="5"/>
+                                        </p:tgtEl>
+                                        <p:attrNameLst>
+                                          <p:attrName>ppt_y</p:attrName>
+                                        </p:attrNameLst>
+                                      </p:cBhvr>
+                                      <p:tavLst>
+                                        <p:tav tm="0">
+                                          <p:val>
+                                            <p:strVal val="1+#ppt_h/2"/>
+                                          </p:val>
+                                        </p:tav>
+                                        <p:tav tm="100000">
+                                          <p:val>
+                                            <p:strVal val="#ppt_y"/>
+                                          </p:val>
+                                        </p:tav>
+                                      </p:tavLst>
+                                    </p:anim>
+                                  </p:childTnLst>
+                                </p:cTn>
+                              </p:par>
+                            </p:childTnLst>
+                          </p:cTn>
+                        </p:par>
+                      </p:childTnLst>
+                    </p:cTn>
+                  </p:par>
+                </p:childTnLst>
+              </p:cTn>
+              <p:prevCondLst>
+                <p:cond evt="onPrev" delay="0">
+                  <p:tgtEl>
+                    <p:sldTgt/>
+                  </p:tgtEl>
+                </p:cond>
+              </p:prevCondLst>
+              <p:nextCondLst>
+                <p:cond evt="onNext" delay="0">
+                  <p:tgtEl>
+                    <p:sldTgt/>
+                  </p:tgtEl>
+                </p:cond>
+              </p:nextCondLst>
+            </p:seq>
+          </p:childTnLst>
+        </p:cTn>
+      </p:par>
+    </p:tnLst>
+    <p:bldLst>
+      <p:bldP spid="2" grpId="0"/>
+    </p:bldLst>
+  </p:timing>
+</p:sld>
+</file>
+
+<file path=ppt/slides/slide4.xml><?xml version="1.0" encoding="utf-8"?>
+<p:sld xmlns:a="http://schemas.openxmlformats.org/drawingml/2006/main" xmlns:r="http://schemas.openxmlformats.org/officeDocument/2006/relationships" xmlns:p="http://schemas.openxmlformats.org/presentationml/2006/main">
+  <p:cSld>
+    <p:spTree>
+      <p:nvGrpSpPr>
+        <p:cNvPr id="1" name=""/>
+        <p:cNvGrpSpPr/>
+        <p:nvPr/>
+      </p:nvGrpSpPr>
+      <p:grpSpPr>
+        <a:xfrm>
+          <a:off x="0" y="0"/>
+          <a:ext cx="0" cy="0"/>
+          <a:chOff x="0" y="0"/>
+          <a:chExt cx="0" cy="0"/>
+        </a:xfrm>
+      </p:grpSpPr>
+      <p:sp>
+        <p:nvSpPr>
+          <p:cNvPr id="2" name="Title 1">
+            <a:extLst>
+              <a:ext uri="{FF2B5EF4-FFF2-40B4-BE49-F238E27FC236}">
+                <a16:creationId xmlns:a16="http://schemas.microsoft.com/office/drawing/2014/main" id="{D85E9FFC-7D2F-41FC-A115-8944C8239EC2}"/>
+              </a:ext>
+            </a:extLst>
+          </p:cNvPr>
+          <p:cNvSpPr>
+            <a:spLocks noGrp="1"/>
+          </p:cNvSpPr>
+          <p:nvPr>
+            <p:ph type="title"/>
+          </p:nvPr>
+        </p:nvSpPr>
+        <p:spPr/>
+        <p:txBody>
+          <a:bodyPr/>
+          <a:lstStyle/>
+          <a:p>
+            <a:r>
+              <a:rPr lang="en-GB" dirty="0"/>
+              <a:t>Current State Of the project</a:t>
+            </a:r>
+          </a:p>
+        </p:txBody>
+      </p:sp>
+      <p:sp>
+        <p:nvSpPr>
+          <p:cNvPr id="3" name="Content Placeholder 2">
+            <a:extLst>
+              <a:ext uri="{FF2B5EF4-FFF2-40B4-BE49-F238E27FC236}">
+                <a16:creationId xmlns:a16="http://schemas.microsoft.com/office/drawing/2014/main" id="{F4A6C17B-F4FA-47EF-9CD3-961F312F2A2F}"/>
+              </a:ext>
+            </a:extLst>
+          </p:cNvPr>
+          <p:cNvSpPr>
+            <a:spLocks noGrp="1"/>
+          </p:cNvSpPr>
+          <p:nvPr>
+            <p:ph idx="1"/>
+          </p:nvPr>
+        </p:nvSpPr>
+        <p:spPr/>
+        <p:txBody>
+          <a:bodyPr/>
+          <a:lstStyle/>
+          <a:p>
+            <a:r>
+              <a:rPr lang="en-GB" dirty="0"/>
+              <a:t>Building is ahead </a:t>
+            </a:r>
+            <a:r>
+              <a:rPr lang="en-GB"/>
+              <a:t>of Schedule</a:t>
+            </a:r>
+          </a:p>
+          <a:p>
+            <a:pPr lvl="1"/>
+            <a:endParaRPr lang="en-GB"/>
+          </a:p>
+        </p:txBody>
+      </p:sp>
+    </p:spTree>
+    <p:extLst>
+      <p:ext uri="{BB962C8B-B14F-4D97-AF65-F5344CB8AC3E}">
+        <p14:creationId xmlns:p14="http://schemas.microsoft.com/office/powerpoint/2010/main" val="588170785"/>
       </p:ext>
     </p:extLst>
   </p:cSld>

</xml_diff>